<commit_message>
feat: Upgrade Data Workshop to Expert Level (Excel VBA/PowerQuery + SQL/NoSQL)
- **Dataset:** Generated `dataset_clients_advanced.xlsx` with cross-sheet data for VLOOKUP/XLOOKUP and advanced Power Query exercises.
- **Documentation:** Enhanced `ReadMeWeek3.md` to cover Advanced Filtering (Criteria Range), Power Query M language, VBA automation, and Google Sheets `QUERY` function.
- **Presentation:** Updated `Atelier_Technique_Data.pptx` (via `generate_technical_slides.py`) to include slides on VBA vs AppScript, SQL Joins vs NoSQL Embedding, and Advanced Sorting.
- **Instructor Guide:** Created `Brief_Pedagogique.docx` (via `generate_brief_docx.py`) containing a detailed grading rubric and correction guide.
- **Package:** Bundled all materials into `Atelier_Data_Expert_Pack.zip`.

Co-authored-by: ArthurStarks <137041166+ArthurStarks@users.noreply.github.com>
</commit_message>
<xml_diff>
--- a/Atelier_Technique_Data.pptx
+++ b/Atelier_Technique_Data.pptx
@@ -3121,7 +3121,7 @@
               </a:defRPr>
             </a:pPr>
             <a:r>
-              <a:t>Atelier Technique : Data Wrangling &amp; Bases de Données</a:t>
+              <a:t>Atelier Technique : Data Expert &amp; SQL</a:t>
             </a:r>
           </a:p>
         </p:txBody>
@@ -3150,7 +3150,7 @@
               </a:defRPr>
             </a:pPr>
             <a:r>
-              <a:t>De l'Excel avancé aux opérations CRUD SQL/NoSQL</a:t>
+              <a:t>Excel Expert (VBA, Power Query) &amp; CRUD SQL/NoSQL</a:t>
             </a:r>
           </a:p>
         </p:txBody>
@@ -3197,7 +3197,7 @@
               </a:defRPr>
             </a:pPr>
             <a:r>
-              <a:t>Checklist du Gestionnaire de Données</a:t>
+              <a:t>Ressources &amp; Outils</a:t>
             </a:r>
           </a:p>
         </p:txBody>
@@ -3237,7 +3237,7 @@
               </a:defRPr>
             </a:pPr>
             <a:r>
-              <a:t>1. Toujours garder une copie du fichier BRUT (Raw Data).</a:t>
+              <a:t>DB Fiddle (SQL Training)</a:t>
             </a:r>
           </a:p>
           <a:p>
@@ -3253,7 +3253,7 @@
               </a:defRPr>
             </a:pPr>
             <a:r>
-              <a:t>2. Ne jamais travailler sur l'original.</a:t>
+              <a:t>MongoDB Atlas (NoSQL Cloud)</a:t>
             </a:r>
           </a:p>
           <a:p>
@@ -3269,7 +3269,7 @@
               </a:defRPr>
             </a:pPr>
             <a:r>
-              <a:t>3. Documenter les nettoyages faits (ex: 'J'ai remplacé les vides par 0').</a:t>
+              <a:t>Stack Overflow (VBA/Excel Help)</a:t>
             </a:r>
           </a:p>
           <a:p>
@@ -3285,7 +3285,7 @@
               </a:defRPr>
             </a:pPr>
             <a:r>
-              <a:t>4. Vérifier les types (Est-ce que '123' est un nombre ou du texte ?).</a:t>
+              <a:t>Documentation Google AppScript</a:t>
             </a:r>
           </a:p>
         </p:txBody>
@@ -3332,7 +3332,7 @@
               </a:defRPr>
             </a:pPr>
             <a:r>
-              <a:t>Au Programme</a:t>
+              <a:t>Au Programme (3h30)</a:t>
             </a:r>
           </a:p>
         </p:txBody>
@@ -3372,7 +3372,7 @@
               </a:defRPr>
             </a:pPr>
             <a:r>
-              <a:t>1. Nettoyage de Données (Excel &amp; Power Query)</a:t>
+              <a:t>1. Tri &amp; Filtres Avancés (Multi-critères, Slicers)</a:t>
             </a:r>
           </a:p>
           <a:p>
@@ -3388,7 +3388,7 @@
               </a:defRPr>
             </a:pPr>
             <a:r>
-              <a:t>2. Tri vs Filtre : Ne plus confondre</a:t>
+              <a:t>2. Croiser les données : VLOOKUP vs Power Query Merge</a:t>
             </a:r>
           </a:p>
           <a:p>
@@ -3404,7 +3404,7 @@
               </a:defRPr>
             </a:pPr>
             <a:r>
-              <a:t>3. SQL vs NoSQL : CRUD en pratique</a:t>
+              <a:t>3. Automatisation : Intro VBA &amp; Google AppScript</a:t>
             </a:r>
           </a:p>
           <a:p>
@@ -3420,7 +3420,7 @@
               </a:defRPr>
             </a:pPr>
             <a:r>
-              <a:t>4. Gestion de Données : Bonnes Pratiques</a:t>
+              <a:t>4. Le langage M (Power Query) pour les cas complexes</a:t>
             </a:r>
           </a:p>
           <a:p>
@@ -3436,7 +3436,23 @@
               </a:defRPr>
             </a:pPr>
             <a:r>
-              <a:t>5. Atelier Pratique : Telco &amp; Banque</a:t>
+              <a:t>5. SQL Jointures (JOIN) vs NoSQL Imbrication</a:t>
+            </a:r>
+          </a:p>
+          <a:p>
+            <a:pPr>
+              <a:spcAft>
+                <a:spcPts val="1000"/>
+              </a:spcAft>
+              <a:defRPr sz="2000">
+                <a:solidFill>
+                  <a:srgbClr val="505050"/>
+                </a:solidFill>
+                <a:latin typeface="Calibri"/>
+              </a:defRPr>
+            </a:pPr>
+            <a:r>
+              <a:t>6. Atelier Pratique : Gestion de Clients Telco</a:t>
             </a:r>
           </a:p>
         </p:txBody>
@@ -3483,82 +3499,111 @@
               </a:defRPr>
             </a:pPr>
             <a:r>
-              <a:t>Le Concept Clé : GIGO</a:t>
-            </a:r>
-          </a:p>
-        </p:txBody>
-      </p:sp>
-      <p:sp>
-        <p:nvSpPr>
-          <p:cNvPr id="3" name="Can 2"/>
+              <a:t>Tri Multi-Niveaux</a:t>
+            </a:r>
+          </a:p>
+        </p:txBody>
+      </p:sp>
+      <p:sp>
+        <p:nvSpPr>
+          <p:cNvPr id="3" name="TextBox 2"/>
+          <p:cNvSpPr txBox="1"/>
+          <p:nvPr/>
+        </p:nvSpPr>
+        <p:spPr>
+          <a:xfrm>
+            <a:off x="457200" y="1371600"/>
+            <a:ext cx="5486400" cy="4572000"/>
+          </a:xfrm>
+          <a:prstGeom prst="rect">
+            <a:avLst/>
+          </a:prstGeom>
+          <a:noFill/>
+        </p:spPr>
+        <p:txBody>
+          <a:bodyPr wrap="square">
+            <a:spAutoFit/>
+          </a:bodyPr>
+          <a:lstStyle/>
+          <a:p/>
+          <a:p>
+            <a:pPr>
+              <a:spcAft>
+                <a:spcPts val="1000"/>
+              </a:spcAft>
+              <a:defRPr sz="2000">
+                <a:solidFill>
+                  <a:srgbClr val="505050"/>
+                </a:solidFill>
+                <a:latin typeface="Calibri"/>
+              </a:defRPr>
+            </a:pPr>
+            <a:r>
+              <a:t>Le Tri simple (A-Z) ne suffit pas.</a:t>
+            </a:r>
+          </a:p>
+          <a:p>
+            <a:pPr>
+              <a:spcAft>
+                <a:spcPts val="1000"/>
+              </a:spcAft>
+              <a:defRPr sz="2000">
+                <a:solidFill>
+                  <a:srgbClr val="505050"/>
+                </a:solidFill>
+                <a:latin typeface="Calibri"/>
+              </a:defRPr>
+            </a:pPr>
+            <a:r>
+              <a:t>Cas réel : Trier par Région, PUIS par Offre, PUIS par Nom.</a:t>
+            </a:r>
+          </a:p>
+          <a:p>
+            <a:pPr>
+              <a:spcAft>
+                <a:spcPts val="1000"/>
+              </a:spcAft>
+              <a:defRPr sz="2000">
+                <a:solidFill>
+                  <a:srgbClr val="505050"/>
+                </a:solidFill>
+                <a:latin typeface="Calibri"/>
+              </a:defRPr>
+            </a:pPr>
+            <a:r>
+              <a:t>Outil : Données &gt; Trier (Custom Sort).</a:t>
+            </a:r>
+          </a:p>
+          <a:p>
+            <a:pPr>
+              <a:spcAft>
+                <a:spcPts val="1000"/>
+              </a:spcAft>
+              <a:defRPr sz="2000">
+                <a:solidFill>
+                  <a:srgbClr val="505050"/>
+                </a:solidFill>
+                <a:latin typeface="Calibri"/>
+              </a:defRPr>
+            </a:pPr>
+            <a:r>
+              <a:t>Astuce : On peut trier par couleur ou icône !</a:t>
+            </a:r>
+          </a:p>
+        </p:txBody>
+      </p:sp>
+      <p:sp>
+        <p:nvSpPr>
+          <p:cNvPr id="4" name="Down Arrow 3"/>
           <p:cNvSpPr/>
           <p:nvPr/>
         </p:nvSpPr>
         <p:spPr>
           <a:xfrm>
-            <a:off x="914400" y="2743200"/>
-            <a:ext cx="1371600" cy="1828800"/>
+            <a:off x="6400800" y="1828800"/>
+            <a:ext cx="914400" cy="2743200"/>
           </a:xfrm>
-          <a:prstGeom prst="can">
-            <a:avLst/>
-          </a:prstGeom>
-          <a:solidFill>
-            <a:srgbClr val="505050"/>
-          </a:solidFill>
-          <a:ln>
-            <a:solidFill>
-              <a:srgbClr val="505050"/>
-            </a:solidFill>
-          </a:ln>
-        </p:spPr>
-        <p:style>
-          <a:lnRef idx="1">
-            <a:schemeClr val="accent1"/>
-          </a:lnRef>
-          <a:fillRef idx="3">
-            <a:schemeClr val="accent1"/>
-          </a:fillRef>
-          <a:effectRef idx="2">
-            <a:schemeClr val="accent1"/>
-          </a:effectRef>
-          <a:fontRef idx="minor">
-            <a:schemeClr val="lt1"/>
-          </a:fontRef>
-        </p:style>
-        <p:txBody>
-          <a:bodyPr rtlCol="0" anchor="ctr"/>
-          <a:lstStyle/>
-          <a:p>
-            <a:pPr algn="ctr">
-              <a:defRPr>
-                <a:solidFill>
-                  <a:srgbClr val="FFFFFF"/>
-                </a:solidFill>
-              </a:defRPr>
-            </a:pPr>
-            <a:r>
-              <a:t>Données Sales</a:t>
-            </a:r>
-          </a:p>
-          <a:p>
-            <a:r>
-              <a:t>(Garbage In)</a:t>
-            </a:r>
-          </a:p>
-        </p:txBody>
-      </p:sp>
-      <p:sp>
-        <p:nvSpPr>
-          <p:cNvPr id="4" name="Right Arrow 3"/>
-          <p:cNvSpPr/>
-          <p:nvPr/>
-        </p:nvSpPr>
-        <p:spPr>
-          <a:xfrm>
-            <a:off x="2743200" y="3200400"/>
-            <a:ext cx="914400" cy="457200"/>
-          </a:xfrm>
-          <a:prstGeom prst="rightArrow">
+          <a:prstGeom prst="downArrow">
             <a:avLst/>
           </a:prstGeom>
           <a:solidFill>
@@ -3588,51 +3633,6 @@
           <a:bodyPr rtlCol="0" anchor="ctr"/>
           <a:lstStyle/>
           <a:p>
-            <a:pPr algn="ctr"/>
-          </a:p>
-        </p:txBody>
-      </p:sp>
-      <p:sp>
-        <p:nvSpPr>
-          <p:cNvPr id="5" name="Gear 6 4"/>
-          <p:cNvSpPr/>
-          <p:nvPr/>
-        </p:nvSpPr>
-        <p:spPr>
-          <a:xfrm>
-            <a:off x="4114800" y="2743200"/>
-            <a:ext cx="1828800" cy="1828800"/>
-          </a:xfrm>
-          <a:prstGeom prst="gear6">
-            <a:avLst/>
-          </a:prstGeom>
-          <a:solidFill>
-            <a:srgbClr val="FF8C00"/>
-          </a:solidFill>
-          <a:ln>
-            <a:solidFill>
-              <a:srgbClr val="505050"/>
-            </a:solidFill>
-          </a:ln>
-        </p:spPr>
-        <p:style>
-          <a:lnRef idx="1">
-            <a:schemeClr val="accent1"/>
-          </a:lnRef>
-          <a:fillRef idx="3">
-            <a:schemeClr val="accent1"/>
-          </a:fillRef>
-          <a:effectRef idx="2">
-            <a:schemeClr val="accent1"/>
-          </a:effectRef>
-          <a:fontRef idx="minor">
-            <a:schemeClr val="lt1"/>
-          </a:fontRef>
-        </p:style>
-        <p:txBody>
-          <a:bodyPr rtlCol="0" anchor="ctr"/>
-          <a:lstStyle/>
-          <a:p>
             <a:pPr algn="ctr">
               <a:defRPr>
                 <a:solidFill>
@@ -3641,151 +3641,17 @@
               </a:defRPr>
             </a:pPr>
             <a:r>
-              <a:t>Traitement</a:t>
-            </a:r>
-          </a:p>
-        </p:txBody>
-      </p:sp>
-      <p:sp>
-        <p:nvSpPr>
-          <p:cNvPr id="6" name="Right Arrow 5"/>
-          <p:cNvSpPr/>
-          <p:nvPr/>
-        </p:nvSpPr>
-        <p:spPr>
-          <a:xfrm>
-            <a:off x="6400800" y="3200400"/>
-            <a:ext cx="914400" cy="457200"/>
-          </a:xfrm>
-          <a:prstGeom prst="rightArrow">
-            <a:avLst/>
-          </a:prstGeom>
-          <a:solidFill>
-            <a:srgbClr val="003399"/>
-          </a:solidFill>
-          <a:ln>
-            <a:solidFill>
-              <a:srgbClr val="505050"/>
-            </a:solidFill>
-          </a:ln>
-        </p:spPr>
-        <p:style>
-          <a:lnRef idx="1">
-            <a:schemeClr val="accent1"/>
-          </a:lnRef>
-          <a:fillRef idx="3">
-            <a:schemeClr val="accent1"/>
-          </a:fillRef>
-          <a:effectRef idx="2">
-            <a:schemeClr val="accent1"/>
-          </a:effectRef>
-          <a:fontRef idx="minor">
-            <a:schemeClr val="lt1"/>
-          </a:fontRef>
-        </p:style>
-        <p:txBody>
-          <a:bodyPr rtlCol="0" anchor="ctr"/>
-          <a:lstStyle/>
-          <a:p>
-            <a:pPr algn="ctr"/>
-          </a:p>
-        </p:txBody>
-      </p:sp>
-      <p:sp>
-        <p:nvSpPr>
-          <p:cNvPr id="7" name="Can 6"/>
-          <p:cNvSpPr/>
-          <p:nvPr/>
-        </p:nvSpPr>
-        <p:spPr>
-          <a:xfrm>
-            <a:off x="7772400" y="2743200"/>
-            <a:ext cx="1371600" cy="1828800"/>
-          </a:xfrm>
-          <a:prstGeom prst="can">
-            <a:avLst/>
-          </a:prstGeom>
-          <a:solidFill>
-            <a:srgbClr val="505050"/>
-          </a:solidFill>
-          <a:ln>
-            <a:solidFill>
-              <a:srgbClr val="505050"/>
-            </a:solidFill>
-          </a:ln>
-        </p:spPr>
-        <p:style>
-          <a:lnRef idx="1">
-            <a:schemeClr val="accent1"/>
-          </a:lnRef>
-          <a:fillRef idx="3">
-            <a:schemeClr val="accent1"/>
-          </a:fillRef>
-          <a:effectRef idx="2">
-            <a:schemeClr val="accent1"/>
-          </a:effectRef>
-          <a:fontRef idx="minor">
-            <a:schemeClr val="lt1"/>
-          </a:fontRef>
-        </p:style>
-        <p:txBody>
-          <a:bodyPr rtlCol="0" anchor="ctr"/>
-          <a:lstStyle/>
-          <a:p>
-            <a:pPr algn="ctr">
-              <a:defRPr>
-                <a:solidFill>
-                  <a:srgbClr val="FFFFFF"/>
-                </a:solidFill>
-              </a:defRPr>
-            </a:pPr>
-            <a:r>
-              <a:t>Résultat Faux</a:t>
-            </a:r>
-          </a:p>
-          <a:p>
-            <a:r>
-              <a:t>(Garbage Out)</a:t>
-            </a:r>
-          </a:p>
-        </p:txBody>
-      </p:sp>
-      <p:sp>
-        <p:nvSpPr>
-          <p:cNvPr id="8" name="TextBox 7"/>
-          <p:cNvSpPr txBox="1"/>
-          <p:nvPr/>
-        </p:nvSpPr>
-        <p:spPr>
-          <a:xfrm>
-            <a:off x="914400" y="5029200"/>
-            <a:ext cx="7315200" cy="4572000"/>
-          </a:xfrm>
-          <a:prstGeom prst="rect">
-            <a:avLst/>
-          </a:prstGeom>
-          <a:noFill/>
-        </p:spPr>
-        <p:txBody>
-          <a:bodyPr wrap="square">
-            <a:spAutoFit/>
-          </a:bodyPr>
-          <a:lstStyle/>
-          <a:p/>
-          <a:p>
-            <a:pPr>
-              <a:spcAft>
-                <a:spcPts val="1000"/>
-              </a:spcAft>
-              <a:defRPr sz="2000">
-                <a:solidFill>
-                  <a:srgbClr val="505050"/>
-                </a:solidFill>
-                <a:latin typeface="Calibri"/>
-              </a:defRPr>
-            </a:pPr>
-            <a:r>
-              <a:t>Exemple Telco : Un numéro '+33 6...' vs '06...' crée deux clients différents !</a:t>
+              <a:t>1. Region</a:t>
+            </a:r>
+          </a:p>
+          <a:p>
+            <a:r>
+              <a:t>2. Offre</a:t>
+            </a:r>
+          </a:p>
+          <a:p>
+            <a:r>
+              <a:t>3. Nom</a:t>
             </a:r>
           </a:p>
         </p:txBody>
@@ -3832,192 +3698,7 @@
               </a:defRPr>
             </a:pPr>
             <a:r>
-              <a:t>Excel : Trier ou Filtrer ?</a:t>
-            </a:r>
-          </a:p>
-        </p:txBody>
-      </p:sp>
-      <p:sp>
-        <p:nvSpPr>
-          <p:cNvPr id="3" name="Up Arrow Callout 2"/>
-          <p:cNvSpPr/>
-          <p:nvPr/>
-        </p:nvSpPr>
-        <p:spPr>
-          <a:xfrm>
-            <a:off x="457200" y="1828800"/>
-            <a:ext cx="3657600" cy="1828800"/>
-          </a:xfrm>
-          <a:prstGeom prst="upArrowCallout">
-            <a:avLst/>
-          </a:prstGeom>
-          <a:solidFill>
-            <a:srgbClr val="003399"/>
-          </a:solidFill>
-          <a:ln>
-            <a:solidFill>
-              <a:srgbClr val="505050"/>
-            </a:solidFill>
-          </a:ln>
-        </p:spPr>
-        <p:style>
-          <a:lnRef idx="1">
-            <a:schemeClr val="accent1"/>
-          </a:lnRef>
-          <a:fillRef idx="3">
-            <a:schemeClr val="accent1"/>
-          </a:fillRef>
-          <a:effectRef idx="2">
-            <a:schemeClr val="accent1"/>
-          </a:effectRef>
-          <a:fontRef idx="minor">
-            <a:schemeClr val="lt1"/>
-          </a:fontRef>
-        </p:style>
-        <p:txBody>
-          <a:bodyPr rtlCol="0" anchor="ctr"/>
-          <a:lstStyle/>
-          <a:p>
-            <a:pPr algn="ctr">
-              <a:defRPr>
-                <a:solidFill>
-                  <a:srgbClr val="FFFFFF"/>
-                </a:solidFill>
-              </a:defRPr>
-            </a:pPr>
-            <a:r>
-              <a:t>TRIER (Sort)</a:t>
-            </a:r>
-          </a:p>
-          <a:p>
-            <a:r>
-              <a:t>Organise l'ordre (A-Z, 1-10).</a:t>
-            </a:r>
-          </a:p>
-          <a:p>
-            <a:r>
-              <a:t>Aucune donnée n'est cachée.</a:t>
-            </a:r>
-          </a:p>
-          <a:p>
-            <a:r>
-              <a:t>Usage : Classement, Top 10.</a:t>
-            </a:r>
-          </a:p>
-        </p:txBody>
-      </p:sp>
-      <p:sp>
-        <p:nvSpPr>
-          <p:cNvPr id="4" name="Funnel 3"/>
-          <p:cNvSpPr/>
-          <p:nvPr/>
-        </p:nvSpPr>
-        <p:spPr>
-          <a:xfrm>
-            <a:off x="4572000" y="1828800"/>
-            <a:ext cx="3657600" cy="1828800"/>
-          </a:xfrm>
-          <a:prstGeom prst="funnel">
-            <a:avLst/>
-          </a:prstGeom>
-          <a:solidFill>
-            <a:srgbClr val="FF8C00"/>
-          </a:solidFill>
-          <a:ln>
-            <a:solidFill>
-              <a:srgbClr val="505050"/>
-            </a:solidFill>
-          </a:ln>
-        </p:spPr>
-        <p:style>
-          <a:lnRef idx="1">
-            <a:schemeClr val="accent1"/>
-          </a:lnRef>
-          <a:fillRef idx="3">
-            <a:schemeClr val="accent1"/>
-          </a:fillRef>
-          <a:effectRef idx="2">
-            <a:schemeClr val="accent1"/>
-          </a:effectRef>
-          <a:fontRef idx="minor">
-            <a:schemeClr val="lt1"/>
-          </a:fontRef>
-        </p:style>
-        <p:txBody>
-          <a:bodyPr rtlCol="0" anchor="ctr"/>
-          <a:lstStyle/>
-          <a:p>
-            <a:pPr algn="ctr">
-              <a:defRPr>
-                <a:solidFill>
-                  <a:srgbClr val="FFFFFF"/>
-                </a:solidFill>
-              </a:defRPr>
-            </a:pPr>
-            <a:r>
-              <a:t>FILTRER (Filter)</a:t>
-            </a:r>
-          </a:p>
-          <a:p>
-            <a:r>
-              <a:t>Masque les lignes non désirées.</a:t>
-            </a:r>
-          </a:p>
-          <a:p>
-            <a:r>
-              <a:t>Attention : Les données cachées existent toujours !</a:t>
-            </a:r>
-          </a:p>
-          <a:p>
-            <a:r>
-              <a:t>Usage : Focus sur une catégorie.</a:t>
-            </a:r>
-          </a:p>
-        </p:txBody>
-      </p:sp>
-    </p:spTree>
-  </p:cSld>
-  <p:clrMapOvr>
-    <a:masterClrMapping/>
-  </p:clrMapOvr>
-</p:sld>
-</file>
-
-<file path=ppt/slides/slide5.xml><?xml version="1.0" encoding="utf-8"?>
-<p:sld xmlns:a="http://schemas.openxmlformats.org/drawingml/2006/main" xmlns:p="http://schemas.openxmlformats.org/presentationml/2006/main" xmlns:r="http://schemas.openxmlformats.org/officeDocument/2006/relationships">
-  <p:cSld>
-    <p:spTree>
-      <p:nvGrpSpPr>
-        <p:cNvPr id="1" name=""/>
-        <p:cNvGrpSpPr/>
-        <p:nvPr/>
-      </p:nvGrpSpPr>
-      <p:grpSpPr/>
-      <p:sp>
-        <p:nvSpPr>
-          <p:cNvPr id="2" name="Title 1"/>
-          <p:cNvSpPr>
-            <a:spLocks noGrp="1"/>
-          </p:cNvSpPr>
-          <p:nvPr>
-            <p:ph type="title"/>
-          </p:nvPr>
-        </p:nvSpPr>
-        <p:spPr/>
-        <p:txBody>
-          <a:bodyPr/>
-          <a:lstStyle/>
-          <a:p>
-            <a:pPr algn="l">
-              <a:defRPr sz="3200">
-                <a:solidFill>
-                  <a:srgbClr val="003399"/>
-                </a:solidFill>
-                <a:latin typeface="Arial"/>
-              </a:defRPr>
-            </a:pPr>
-            <a:r>
-              <a:t>Au-delà d'Excel : Power Query</a:t>
+              <a:t>Filtres Avancés (Criteria Range)</a:t>
             </a:r>
           </a:p>
         </p:txBody>
@@ -4031,7 +3712,7 @@
         <p:spPr>
           <a:xfrm>
             <a:off x="457200" y="1371600"/>
-            <a:ext cx="7315200" cy="4572000"/>
+            <a:ext cx="8229600" cy="4572000"/>
           </a:xfrm>
           <a:prstGeom prst="rect">
             <a:avLst/>
@@ -4057,7 +3738,7 @@
               </a:defRPr>
             </a:pPr>
             <a:r>
-              <a:t>Pourquoi ? Excel plante après 1M lignes. Power Query automatise.</a:t>
+              <a:t>Pour des conditions complexes (ET / OU).</a:t>
             </a:r>
           </a:p>
           <a:p>
@@ -4073,7 +3754,7 @@
               </a:defRPr>
             </a:pPr>
             <a:r>
-              <a:t>Fonctionnalité clé : ETL (Extract, Transform, Load).</a:t>
+              <a:t>Nécessite une 'Zone de critères' séparée.</a:t>
             </a:r>
           </a:p>
           <a:p>
@@ -4089,7 +3770,23 @@
               </a:defRPr>
             </a:pPr>
             <a:r>
-              <a:t>Exemple : Séparer 'Nom Prénom' en 2 colonnes.</a:t>
+              <a:t>Permet d'extraire les données vers une autre feuille.</a:t>
+            </a:r>
+          </a:p>
+          <a:p>
+            <a:pPr>
+              <a:spcAft>
+                <a:spcPts val="1000"/>
+              </a:spcAft>
+              <a:defRPr sz="2000">
+                <a:solidFill>
+                  <a:srgbClr val="505050"/>
+                </a:solidFill>
+                <a:latin typeface="Calibri"/>
+              </a:defRPr>
+            </a:pPr>
+            <a:r>
+              <a:t>Alternative moderne : Fonction FILTER() (Office 365).</a:t>
             </a:r>
           </a:p>
         </p:txBody>
@@ -4102,8 +3799,8 @@
         </p:nvSpPr>
         <p:spPr>
           <a:xfrm>
-            <a:off x="914400" y="3657600"/>
-            <a:ext cx="7315200" cy="2743200"/>
+            <a:off x="914400" y="4114800"/>
+            <a:ext cx="7315200" cy="2286000"/>
           </a:xfrm>
           <a:prstGeom prst="rect">
             <a:avLst/>
@@ -4141,7 +3838,217 @@
               </a:defRPr>
             </a:pPr>
             <a:r>
-              <a:t>[Capture d'écran : Power Query Editor : Colonne 'Split by Delimiter']</a:t>
+              <a:t>[Capture d'écran : Boîte de dialogue 'Filtre Avancé' avec Plage et Critères]</a:t>
+            </a:r>
+          </a:p>
+        </p:txBody>
+      </p:sp>
+    </p:spTree>
+  </p:cSld>
+  <p:clrMapOvr>
+    <a:masterClrMapping/>
+  </p:clrMapOvr>
+</p:sld>
+</file>
+
+<file path=ppt/slides/slide5.xml><?xml version="1.0" encoding="utf-8"?>
+<p:sld xmlns:a="http://schemas.openxmlformats.org/drawingml/2006/main" xmlns:p="http://schemas.openxmlformats.org/presentationml/2006/main" xmlns:r="http://schemas.openxmlformats.org/officeDocument/2006/relationships">
+  <p:cSld>
+    <p:spTree>
+      <p:nvGrpSpPr>
+        <p:cNvPr id="1" name=""/>
+        <p:cNvGrpSpPr/>
+        <p:nvPr/>
+      </p:nvGrpSpPr>
+      <p:grpSpPr/>
+      <p:sp>
+        <p:nvSpPr>
+          <p:cNvPr id="2" name="Title 1"/>
+          <p:cNvSpPr>
+            <a:spLocks noGrp="1"/>
+          </p:cNvSpPr>
+          <p:nvPr>
+            <p:ph type="title"/>
+          </p:nvPr>
+        </p:nvSpPr>
+        <p:spPr/>
+        <p:txBody>
+          <a:bodyPr/>
+          <a:lstStyle/>
+          <a:p>
+            <a:pPr algn="l">
+              <a:defRPr sz="3200">
+                <a:solidFill>
+                  <a:srgbClr val="003399"/>
+                </a:solidFill>
+                <a:latin typeface="Arial"/>
+              </a:defRPr>
+            </a:pPr>
+            <a:r>
+              <a:t>Power Query : Langage M</a:t>
+            </a:r>
+          </a:p>
+        </p:txBody>
+      </p:sp>
+      <p:sp>
+        <p:nvSpPr>
+          <p:cNvPr id="3" name="TextBox 2"/>
+          <p:cNvSpPr txBox="1"/>
+          <p:nvPr/>
+        </p:nvSpPr>
+        <p:spPr>
+          <a:xfrm>
+            <a:off x="457200" y="1371600"/>
+            <a:ext cx="4572000" cy="4572000"/>
+          </a:xfrm>
+          <a:prstGeom prst="rect">
+            <a:avLst/>
+          </a:prstGeom>
+          <a:noFill/>
+        </p:spPr>
+        <p:txBody>
+          <a:bodyPr wrap="square">
+            <a:spAutoFit/>
+          </a:bodyPr>
+          <a:lstStyle/>
+          <a:p/>
+          <a:p>
+            <a:pPr>
+              <a:spcAft>
+                <a:spcPts val="1000"/>
+              </a:spcAft>
+              <a:defRPr sz="2000">
+                <a:solidFill>
+                  <a:srgbClr val="505050"/>
+                </a:solidFill>
+                <a:latin typeface="Calibri"/>
+              </a:defRPr>
+            </a:pPr>
+            <a:r>
+              <a:t>Derrière chaque clic, Power Query écrit du code M.</a:t>
+            </a:r>
+          </a:p>
+          <a:p>
+            <a:pPr>
+              <a:spcAft>
+                <a:spcPts val="1000"/>
+              </a:spcAft>
+              <a:defRPr sz="2000">
+                <a:solidFill>
+                  <a:srgbClr val="505050"/>
+                </a:solidFill>
+                <a:latin typeface="Calibri"/>
+              </a:defRPr>
+            </a:pPr>
+            <a:r>
+              <a:t>On peut l'éditer pour des calculs complexes.</a:t>
+            </a:r>
+          </a:p>
+          <a:p>
+            <a:pPr>
+              <a:spcAft>
+                <a:spcPts val="1000"/>
+              </a:spcAft>
+              <a:defRPr sz="2000">
+                <a:solidFill>
+                  <a:srgbClr val="505050"/>
+                </a:solidFill>
+                <a:latin typeface="Calibri"/>
+              </a:defRPr>
+            </a:pPr>
+            <a:r>
+              <a:t>Exemple : Date.FromText([DateString])</a:t>
+            </a:r>
+          </a:p>
+          <a:p>
+            <a:pPr>
+              <a:spcAft>
+                <a:spcPts val="1000"/>
+              </a:spcAft>
+              <a:defRPr sz="2000">
+                <a:solidFill>
+                  <a:srgbClr val="505050"/>
+                </a:solidFill>
+                <a:latin typeface="Calibri"/>
+              </a:defRPr>
+            </a:pPr>
+            <a:r>
+              <a:t>Exemple : Text.Select([Phone], {'0'..'9'})</a:t>
+            </a:r>
+          </a:p>
+        </p:txBody>
+      </p:sp>
+      <p:sp>
+        <p:nvSpPr>
+          <p:cNvPr id="4" name="Rectangle 3"/>
+          <p:cNvSpPr/>
+          <p:nvPr/>
+        </p:nvSpPr>
+        <p:spPr>
+          <a:xfrm>
+            <a:off x="5029200" y="1828800"/>
+            <a:ext cx="3657600" cy="3657600"/>
+          </a:xfrm>
+          <a:prstGeom prst="rect">
+            <a:avLst/>
+          </a:prstGeom>
+          <a:solidFill>
+            <a:srgbClr val="F0F0F0"/>
+          </a:solidFill>
+          <a:ln>
+            <a:solidFill>
+              <a:srgbClr val="505050"/>
+            </a:solidFill>
+          </a:ln>
+        </p:spPr>
+        <p:style>
+          <a:lnRef idx="1">
+            <a:schemeClr val="accent1"/>
+          </a:lnRef>
+          <a:fillRef idx="3">
+            <a:schemeClr val="accent1"/>
+          </a:fillRef>
+          <a:effectRef idx="2">
+            <a:schemeClr val="accent1"/>
+          </a:effectRef>
+          <a:fontRef idx="minor">
+            <a:schemeClr val="lt1"/>
+          </a:fontRef>
+        </p:style>
+        <p:txBody>
+          <a:bodyPr rtlCol="0" anchor="ctr"/>
+          <a:lstStyle/>
+          <a:p>
+            <a:pPr algn="l">
+              <a:defRPr sz="1400">
+                <a:solidFill>
+                  <a:srgbClr val="000000"/>
+                </a:solidFill>
+                <a:latin typeface="Consolas"/>
+              </a:defRPr>
+            </a:pPr>
+            <a:r>
+              <a:t>let</a:t>
+            </a:r>
+            <a:br/>
+            <a:r>
+              <a:t>  Source = Excel.CurrentWorkbook(){[Name='Table1']}[Content],</a:t>
+            </a:r>
+            <a:br/>
+            <a:r>
+              <a:t>  ChangedType = Table.TransformColumnTypes(Source,{{'Date', type date}}),</a:t>
+            </a:r>
+            <a:br/>
+            <a:r>
+              <a:t>  FilteredRows = Table.SelectRows(ChangedType, each ([Montant] &gt; 100))</a:t>
+            </a:r>
+            <a:br/>
+            <a:r>
+              <a:t>in</a:t>
+            </a:r>
+            <a:br/>
+            <a:r>
+              <a:t>  FilteredRows</a:t>
             </a:r>
           </a:p>
         </p:txBody>
@@ -4188,7 +4095,7 @@
               </a:defRPr>
             </a:pPr>
             <a:r>
-              <a:t>SQL : Le Langage Structuré</a:t>
+              <a:t>Automatisation : Le Duel</a:t>
             </a:r>
           </a:p>
         </p:txBody>
@@ -4202,7 +4109,7 @@
         <p:spPr>
           <a:xfrm>
             <a:off x="457200" y="1828800"/>
-            <a:ext cx="2743200" cy="1828800"/>
+            <a:ext cx="3657600" cy="3657600"/>
           </a:xfrm>
           <a:prstGeom prst="rect">
             <a:avLst/>
@@ -4242,12 +4149,28 @@
               </a:defRPr>
             </a:pPr>
             <a:r>
-              <a:t>Table 'Clients'</a:t>
-            </a:r>
-          </a:p>
-          <a:p>
-            <a:r>
-              <a:t>ID | Nom | Solde</a:t>
+              <a:t>VBA (Excel)</a:t>
+            </a:r>
+          </a:p>
+          <a:p/>
+          <a:p>
+            <a:r>
+              <a:t>Ancien mais robuste.</a:t>
+            </a:r>
+          </a:p>
+          <a:p>
+            <a:r>
+              <a:t>Local (Desktop).</a:t>
+            </a:r>
+          </a:p>
+          <a:p>
+            <a:r>
+              <a:t>Langage : Visual Basic.</a:t>
+            </a:r>
+          </a:p>
+          <a:p>
+            <a:r>
+              <a:t>Idéal pour formulaires UserForm.</a:t>
             </a:r>
           </a:p>
         </p:txBody>
@@ -4260,8 +4183,202 @@
         </p:nvSpPr>
         <p:spPr>
           <a:xfrm>
-            <a:off x="3657600" y="1828800"/>
-            <a:ext cx="5029200" cy="4572000"/>
+            <a:off x="4572000" y="1828800"/>
+            <a:ext cx="3657600" cy="3657600"/>
+          </a:xfrm>
+          <a:prstGeom prst="rect">
+            <a:avLst/>
+          </a:prstGeom>
+          <a:solidFill>
+            <a:srgbClr val="FF8C00"/>
+          </a:solidFill>
+          <a:ln>
+            <a:solidFill>
+              <a:srgbClr val="505050"/>
+            </a:solidFill>
+          </a:ln>
+        </p:spPr>
+        <p:style>
+          <a:lnRef idx="1">
+            <a:schemeClr val="accent1"/>
+          </a:lnRef>
+          <a:fillRef idx="3">
+            <a:schemeClr val="accent1"/>
+          </a:fillRef>
+          <a:effectRef idx="2">
+            <a:schemeClr val="accent1"/>
+          </a:effectRef>
+          <a:fontRef idx="minor">
+            <a:schemeClr val="lt1"/>
+          </a:fontRef>
+        </p:style>
+        <p:txBody>
+          <a:bodyPr rtlCol="0" anchor="ctr"/>
+          <a:lstStyle/>
+          <a:p>
+            <a:pPr algn="ctr">
+              <a:defRPr>
+                <a:solidFill>
+                  <a:srgbClr val="FFFFFF"/>
+                </a:solidFill>
+              </a:defRPr>
+            </a:pPr>
+            <a:r>
+              <a:t>AppScript (Google)</a:t>
+            </a:r>
+          </a:p>
+          <a:p/>
+          <a:p>
+            <a:r>
+              <a:t>Moderne (Cloud).</a:t>
+            </a:r>
+          </a:p>
+          <a:p>
+            <a:r>
+              <a:t>Web (Browser).</a:t>
+            </a:r>
+          </a:p>
+          <a:p>
+            <a:r>
+              <a:t>Langage : JavaScript.</a:t>
+            </a:r>
+          </a:p>
+          <a:p>
+            <a:r>
+              <a:t>Idéal pour connecteurs (Gmail, Drive).</a:t>
+            </a:r>
+          </a:p>
+        </p:txBody>
+      </p:sp>
+    </p:spTree>
+  </p:cSld>
+  <p:clrMapOvr>
+    <a:masterClrMapping/>
+  </p:clrMapOvr>
+</p:sld>
+</file>
+
+<file path=ppt/slides/slide7.xml><?xml version="1.0" encoding="utf-8"?>
+<p:sld xmlns:a="http://schemas.openxmlformats.org/drawingml/2006/main" xmlns:p="http://schemas.openxmlformats.org/presentationml/2006/main" xmlns:r="http://schemas.openxmlformats.org/officeDocument/2006/relationships">
+  <p:cSld>
+    <p:spTree>
+      <p:nvGrpSpPr>
+        <p:cNvPr id="1" name=""/>
+        <p:cNvGrpSpPr/>
+        <p:nvPr/>
+      </p:nvGrpSpPr>
+      <p:grpSpPr/>
+      <p:sp>
+        <p:nvSpPr>
+          <p:cNvPr id="2" name="Title 1"/>
+          <p:cNvSpPr>
+            <a:spLocks noGrp="1"/>
+          </p:cNvSpPr>
+          <p:nvPr>
+            <p:ph type="title"/>
+          </p:nvPr>
+        </p:nvSpPr>
+        <p:spPr/>
+        <p:txBody>
+          <a:bodyPr/>
+          <a:lstStyle/>
+          <a:p>
+            <a:pPr algn="l">
+              <a:defRPr sz="3200">
+                <a:solidFill>
+                  <a:srgbClr val="003399"/>
+                </a:solidFill>
+                <a:latin typeface="Arial"/>
+              </a:defRPr>
+            </a:pPr>
+            <a:r>
+              <a:t>Google Sheets : QUERY()</a:t>
+            </a:r>
+          </a:p>
+        </p:txBody>
+      </p:sp>
+      <p:sp>
+        <p:nvSpPr>
+          <p:cNvPr id="3" name="TextBox 2"/>
+          <p:cNvSpPr txBox="1"/>
+          <p:nvPr/>
+        </p:nvSpPr>
+        <p:spPr>
+          <a:xfrm>
+            <a:off x="457200" y="1371600"/>
+            <a:ext cx="8229600" cy="4572000"/>
+          </a:xfrm>
+          <a:prstGeom prst="rect">
+            <a:avLst/>
+          </a:prstGeom>
+          <a:noFill/>
+        </p:spPr>
+        <p:txBody>
+          <a:bodyPr wrap="square">
+            <a:spAutoFit/>
+          </a:bodyPr>
+          <a:lstStyle/>
+          <a:p/>
+          <a:p>
+            <a:pPr>
+              <a:spcAft>
+                <a:spcPts val="1000"/>
+              </a:spcAft>
+              <a:defRPr sz="2000">
+                <a:solidFill>
+                  <a:srgbClr val="505050"/>
+                </a:solidFill>
+                <a:latin typeface="Calibri"/>
+              </a:defRPr>
+            </a:pPr>
+            <a:r>
+              <a:t>La puissance du SQL directement dans le tableur.</a:t>
+            </a:r>
+          </a:p>
+          <a:p>
+            <a:pPr>
+              <a:spcAft>
+                <a:spcPts val="1000"/>
+              </a:spcAft>
+              <a:defRPr sz="2000">
+                <a:solidFill>
+                  <a:srgbClr val="505050"/>
+                </a:solidFill>
+                <a:latin typeface="Calibri"/>
+              </a:defRPr>
+            </a:pPr>
+            <a:r>
+              <a:t>Plus flexible que les TCD (Tableaux Croisés Dynamiques).</a:t>
+            </a:r>
+          </a:p>
+          <a:p>
+            <a:pPr>
+              <a:spcAft>
+                <a:spcPts val="1000"/>
+              </a:spcAft>
+              <a:defRPr sz="2000">
+                <a:solidFill>
+                  <a:srgbClr val="505050"/>
+                </a:solidFill>
+                <a:latin typeface="Calibri"/>
+              </a:defRPr>
+            </a:pPr>
+            <a:r>
+              <a:t>Syntaxe : =QUERY(Données; 'SELECT A, SUM(B) GROUP BY A'; 1)</a:t>
+            </a:r>
+          </a:p>
+        </p:txBody>
+      </p:sp>
+      <p:sp>
+        <p:nvSpPr>
+          <p:cNvPr id="4" name="Rectangle 3"/>
+          <p:cNvSpPr/>
+          <p:nvPr/>
+        </p:nvSpPr>
+        <p:spPr>
+          <a:xfrm>
+            <a:off x="914400" y="3657600"/>
+            <a:ext cx="7315200" cy="1828800"/>
           </a:xfrm>
           <a:prstGeom prst="rect">
             <a:avLst/>
@@ -4302,43 +4419,23 @@
               </a:defRPr>
             </a:pPr>
             <a:r>
-              <a:t>CREATE TABLE Clients (id INT, nom VARCHAR(50));</a:t>
+              <a:t>=QUERY(A1:D100; </a:t>
             </a:r>
             <a:br/>
+            <a:r>
+              <a:t>  "SELECT A, AVG(C) </a:t>
+            </a:r>
             <a:br/>
             <a:r>
-              <a:t>-- C: Create</a:t>
+              <a:t>   WHERE D = 'Actif' </a:t>
             </a:r>
             <a:br/>
             <a:r>
-              <a:t>INSERT INTO Clients VALUES (1, 'Jean');</a:t>
+              <a:t>   GROUP BY A </a:t>
             </a:r>
             <a:br/>
-            <a:br/>
-            <a:r>
-              <a:t>-- R: Read</a:t>
-            </a:r>
-            <a:br/>
-            <a:r>
-              <a:t>SELECT * FROM Clients WHERE id=1;</a:t>
-            </a:r>
-            <a:br/>
-            <a:br/>
-            <a:r>
-              <a:t>-- U: Update</a:t>
-            </a:r>
-            <a:br/>
-            <a:r>
-              <a:t>UPDATE Clients SET nom='Paul' WHERE id=1;</a:t>
-            </a:r>
-            <a:br/>
-            <a:br/>
-            <a:r>
-              <a:t>-- D: Delete</a:t>
-            </a:r>
-            <a:br/>
-            <a:r>
-              <a:t>DELETE FROM Clients WHERE id=1;</a:t>
+            <a:r>
+              <a:t>   LABEL AVG(C) 'Moyenne'")</a:t>
             </a:r>
           </a:p>
         </p:txBody>
@@ -4351,7 +4448,7 @@
 </p:sld>
 </file>
 
-<file path=ppt/slides/slide7.xml><?xml version="1.0" encoding="utf-8"?>
+<file path=ppt/slides/slide8.xml><?xml version="1.0" encoding="utf-8"?>
 <p:sld xmlns:a="http://schemas.openxmlformats.org/drawingml/2006/main" xmlns:p="http://schemas.openxmlformats.org/presentationml/2006/main" xmlns:r="http://schemas.openxmlformats.org/officeDocument/2006/relationships">
   <p:cSld>
     <p:spTree>
@@ -4385,7 +4482,7 @@
               </a:defRPr>
             </a:pPr>
             <a:r>
-              <a:t>NoSQL : L'Approche Document</a:t>
+              <a:t>SQL : Les Jointures (JOIN)</a:t>
             </a:r>
           </a:p>
         </p:txBody>
@@ -4398,8 +4495,331 @@
         </p:nvSpPr>
         <p:spPr>
           <a:xfrm>
-            <a:off x="457200" y="1828800"/>
-            <a:ext cx="3200400" cy="2743200"/>
+            <a:off x="914400" y="2743200"/>
+            <a:ext cx="1828800" cy="1371600"/>
+          </a:xfrm>
+          <a:prstGeom prst="rect">
+            <a:avLst/>
+          </a:prstGeom>
+          <a:solidFill>
+            <a:srgbClr val="003399"/>
+          </a:solidFill>
+          <a:ln>
+            <a:solidFill>
+              <a:srgbClr val="505050"/>
+            </a:solidFill>
+          </a:ln>
+        </p:spPr>
+        <p:style>
+          <a:lnRef idx="1">
+            <a:schemeClr val="accent1"/>
+          </a:lnRef>
+          <a:fillRef idx="3">
+            <a:schemeClr val="accent1"/>
+          </a:fillRef>
+          <a:effectRef idx="2">
+            <a:schemeClr val="accent1"/>
+          </a:effectRef>
+          <a:fontRef idx="minor">
+            <a:schemeClr val="lt1"/>
+          </a:fontRef>
+        </p:style>
+        <p:txBody>
+          <a:bodyPr rtlCol="0" anchor="ctr"/>
+          <a:lstStyle/>
+          <a:p>
+            <a:pPr algn="ctr">
+              <a:defRPr>
+                <a:solidFill>
+                  <a:srgbClr val="FFFFFF"/>
+                </a:solidFill>
+              </a:defRPr>
+            </a:pPr>
+            <a:r>
+              <a:t>Table Clients</a:t>
+            </a:r>
+          </a:p>
+          <a:p>
+            <a:r>
+              <a:t>(ID_Offre)</a:t>
+            </a:r>
+          </a:p>
+        </p:txBody>
+      </p:sp>
+      <p:sp>
+        <p:nvSpPr>
+          <p:cNvPr id="4" name="Rectangle 3"/>
+          <p:cNvSpPr/>
+          <p:nvPr/>
+        </p:nvSpPr>
+        <p:spPr>
+          <a:xfrm>
+            <a:off x="4572000" y="2743200"/>
+            <a:ext cx="1828800" cy="1371600"/>
+          </a:xfrm>
+          <a:prstGeom prst="rect">
+            <a:avLst/>
+          </a:prstGeom>
+          <a:solidFill>
+            <a:srgbClr val="505050"/>
+          </a:solidFill>
+          <a:ln>
+            <a:solidFill>
+              <a:srgbClr val="505050"/>
+            </a:solidFill>
+          </a:ln>
+        </p:spPr>
+        <p:style>
+          <a:lnRef idx="1">
+            <a:schemeClr val="accent1"/>
+          </a:lnRef>
+          <a:fillRef idx="3">
+            <a:schemeClr val="accent1"/>
+          </a:fillRef>
+          <a:effectRef idx="2">
+            <a:schemeClr val="accent1"/>
+          </a:effectRef>
+          <a:fontRef idx="minor">
+            <a:schemeClr val="lt1"/>
+          </a:fontRef>
+        </p:style>
+        <p:txBody>
+          <a:bodyPr rtlCol="0" anchor="ctr"/>
+          <a:lstStyle/>
+          <a:p>
+            <a:pPr algn="ctr">
+              <a:defRPr>
+                <a:solidFill>
+                  <a:srgbClr val="FFFFFF"/>
+                </a:solidFill>
+              </a:defRPr>
+            </a:pPr>
+            <a:r>
+              <a:t>Table Offres</a:t>
+            </a:r>
+          </a:p>
+          <a:p>
+            <a:r>
+              <a:t>(ID_Offre)</a:t>
+            </a:r>
+          </a:p>
+        </p:txBody>
+      </p:sp>
+      <p:cxnSp>
+        <p:nvCxnSpPr>
+          <p:cNvPr id="5" name="Connector 4"/>
+          <p:cNvCxnSpPr/>
+          <p:nvPr/>
+        </p:nvCxnSpPr>
+        <p:spPr>
+          <a:xfrm>
+            <a:off x="2743200" y="3429000"/>
+            <a:ext cx="1828800" cy="0"/>
+          </a:xfrm>
+          <a:prstGeom prst="line">
+            <a:avLst/>
+          </a:prstGeom>
+        </p:spPr>
+        <p:style>
+          <a:lnRef idx="2">
+            <a:schemeClr val="accent1"/>
+          </a:lnRef>
+          <a:fillRef idx="0">
+            <a:schemeClr val="accent1"/>
+          </a:fillRef>
+          <a:effectRef idx="1">
+            <a:schemeClr val="accent1"/>
+          </a:effectRef>
+          <a:fontRef idx="minor">
+            <a:schemeClr val="tx1"/>
+          </a:fontRef>
+        </p:style>
+      </p:cxnSp>
+      <p:sp>
+        <p:nvSpPr>
+          <p:cNvPr id="6" name="TextBox 5"/>
+          <p:cNvSpPr txBox="1"/>
+          <p:nvPr/>
+        </p:nvSpPr>
+        <p:spPr>
+          <a:xfrm>
+            <a:off x="914400" y="4572000"/>
+            <a:ext cx="7315200" cy="4572000"/>
+          </a:xfrm>
+          <a:prstGeom prst="rect">
+            <a:avLst/>
+          </a:prstGeom>
+          <a:noFill/>
+        </p:spPr>
+        <p:txBody>
+          <a:bodyPr wrap="square">
+            <a:spAutoFit/>
+          </a:bodyPr>
+          <a:lstStyle/>
+          <a:p/>
+          <a:p>
+            <a:pPr>
+              <a:spcAft>
+                <a:spcPts val="1000"/>
+              </a:spcAft>
+              <a:defRPr sz="2000">
+                <a:solidFill>
+                  <a:srgbClr val="505050"/>
+                </a:solidFill>
+                <a:latin typeface="Calibri"/>
+              </a:defRPr>
+            </a:pPr>
+            <a:r>
+              <a:t>INNER JOIN : Prend l'intersection des deux tables basées sur une clé commune.</a:t>
+            </a:r>
+          </a:p>
+        </p:txBody>
+      </p:sp>
+    </p:spTree>
+  </p:cSld>
+  <p:clrMapOvr>
+    <a:masterClrMapping/>
+  </p:clrMapOvr>
+</p:sld>
+</file>
+
+<file path=ppt/slides/slide9.xml><?xml version="1.0" encoding="utf-8"?>
+<p:sld xmlns:a="http://schemas.openxmlformats.org/drawingml/2006/main" xmlns:p="http://schemas.openxmlformats.org/presentationml/2006/main" xmlns:r="http://schemas.openxmlformats.org/officeDocument/2006/relationships">
+  <p:cSld>
+    <p:spTree>
+      <p:nvGrpSpPr>
+        <p:cNvPr id="1" name=""/>
+        <p:cNvGrpSpPr/>
+        <p:nvPr/>
+      </p:nvGrpSpPr>
+      <p:grpSpPr/>
+      <p:sp>
+        <p:nvSpPr>
+          <p:cNvPr id="2" name="Title 1"/>
+          <p:cNvSpPr>
+            <a:spLocks noGrp="1"/>
+          </p:cNvSpPr>
+          <p:nvPr>
+            <p:ph type="title"/>
+          </p:nvPr>
+        </p:nvSpPr>
+        <p:spPr/>
+        <p:txBody>
+          <a:bodyPr/>
+          <a:lstStyle/>
+          <a:p>
+            <a:pPr algn="l">
+              <a:defRPr sz="3200">
+                <a:solidFill>
+                  <a:srgbClr val="003399"/>
+                </a:solidFill>
+                <a:latin typeface="Arial"/>
+              </a:defRPr>
+            </a:pPr>
+            <a:r>
+              <a:t>NoSQL : Pas de JOIN !</a:t>
+            </a:r>
+          </a:p>
+        </p:txBody>
+      </p:sp>
+      <p:sp>
+        <p:nvSpPr>
+          <p:cNvPr id="3" name="TextBox 2"/>
+          <p:cNvSpPr txBox="1"/>
+          <p:nvPr/>
+        </p:nvSpPr>
+        <p:spPr>
+          <a:xfrm>
+            <a:off x="457200" y="1371600"/>
+            <a:ext cx="8229600" cy="4572000"/>
+          </a:xfrm>
+          <a:prstGeom prst="rect">
+            <a:avLst/>
+          </a:prstGeom>
+          <a:noFill/>
+        </p:spPr>
+        <p:txBody>
+          <a:bodyPr wrap="square">
+            <a:spAutoFit/>
+          </a:bodyPr>
+          <a:lstStyle/>
+          <a:p/>
+          <a:p>
+            <a:pPr>
+              <a:spcAft>
+                <a:spcPts val="1000"/>
+              </a:spcAft>
+              <a:defRPr sz="2000">
+                <a:solidFill>
+                  <a:srgbClr val="505050"/>
+                </a:solidFill>
+                <a:latin typeface="Calibri"/>
+              </a:defRPr>
+            </a:pPr>
+            <a:r>
+              <a:t>En NoSQL, on évite les relations complexes.</a:t>
+            </a:r>
+          </a:p>
+          <a:p>
+            <a:pPr>
+              <a:spcAft>
+                <a:spcPts val="1000"/>
+              </a:spcAft>
+              <a:defRPr sz="2000">
+                <a:solidFill>
+                  <a:srgbClr val="505050"/>
+                </a:solidFill>
+                <a:latin typeface="Calibri"/>
+              </a:defRPr>
+            </a:pPr>
+            <a:r>
+              <a:t>On préfère imbriquer les données (Embedding).</a:t>
+            </a:r>
+          </a:p>
+          <a:p>
+            <a:pPr>
+              <a:spcAft>
+                <a:spcPts val="1000"/>
+              </a:spcAft>
+              <a:defRPr sz="2000">
+                <a:solidFill>
+                  <a:srgbClr val="505050"/>
+                </a:solidFill>
+                <a:latin typeface="Calibri"/>
+              </a:defRPr>
+            </a:pPr>
+            <a:r>
+              <a:t>Avantage : Lecture ultra-rapide (1 seul accès disque).</a:t>
+            </a:r>
+          </a:p>
+          <a:p>
+            <a:pPr>
+              <a:spcAft>
+                <a:spcPts val="1000"/>
+              </a:spcAft>
+              <a:defRPr sz="2000">
+                <a:solidFill>
+                  <a:srgbClr val="505050"/>
+                </a:solidFill>
+                <a:latin typeface="Calibri"/>
+              </a:defRPr>
+            </a:pPr>
+            <a:r>
+              <a:t>Inconvénient : Duplication de données.</a:t>
+            </a:r>
+          </a:p>
+        </p:txBody>
+      </p:sp>
+      <p:sp>
+        <p:nvSpPr>
+          <p:cNvPr id="4" name="Rectangle 3"/>
+          <p:cNvSpPr/>
+          <p:nvPr/>
+        </p:nvSpPr>
+        <p:spPr>
+          <a:xfrm>
+            <a:off x="5486400" y="2286000"/>
+            <a:ext cx="2743200" cy="2743200"/>
           </a:xfrm>
           <a:prstGeom prst="rect">
             <a:avLst/>
@@ -4444,468 +4864,27 @@
             </a:r>
             <a:br/>
             <a:r>
-              <a:t>  '_id': 1,</a:t>
+              <a:t>  'nom': 'Jean',</a:t>
             </a:r>
             <a:br/>
             <a:r>
-              <a:t>  'nom': 'Jean',</a:t>
+              <a:t>  'adresse': { </a:t>
             </a:r>
             <a:br/>
             <a:r>
-              <a:t>  'historique': ['Achat1', 'Achat2']</a:t>
+              <a:t>    'rue': 'Main St', </a:t>
             </a:r>
             <a:br/>
             <a:r>
+              <a:t>    'ville': 'Paris' </a:t>
+            </a:r>
+            <a:br/>
+            <a:r>
+              <a:t>  }</a:t>
+            </a:r>
+            <a:br/>
+            <a:r>
               <a:t>}</a:t>
-            </a:r>
-          </a:p>
-        </p:txBody>
-      </p:sp>
-      <p:sp>
-        <p:nvSpPr>
-          <p:cNvPr id="4" name="Rectangle 3"/>
-          <p:cNvSpPr/>
-          <p:nvPr/>
-        </p:nvSpPr>
-        <p:spPr>
-          <a:xfrm>
-            <a:off x="4114800" y="1828800"/>
-            <a:ext cx="4572000" cy="4572000"/>
-          </a:xfrm>
-          <a:prstGeom prst="rect">
-            <a:avLst/>
-          </a:prstGeom>
-          <a:solidFill>
-            <a:srgbClr val="F0F0F0"/>
-          </a:solidFill>
-          <a:ln>
-            <a:solidFill>
-              <a:srgbClr val="505050"/>
-            </a:solidFill>
-          </a:ln>
-        </p:spPr>
-        <p:style>
-          <a:lnRef idx="1">
-            <a:schemeClr val="accent1"/>
-          </a:lnRef>
-          <a:fillRef idx="3">
-            <a:schemeClr val="accent1"/>
-          </a:fillRef>
-          <a:effectRef idx="2">
-            <a:schemeClr val="accent1"/>
-          </a:effectRef>
-          <a:fontRef idx="minor">
-            <a:schemeClr val="lt1"/>
-          </a:fontRef>
-        </p:style>
-        <p:txBody>
-          <a:bodyPr rtlCol="0" anchor="ctr"/>
-          <a:lstStyle/>
-          <a:p>
-            <a:pPr algn="l">
-              <a:defRPr sz="1400">
-                <a:solidFill>
-                  <a:srgbClr val="000000"/>
-                </a:solidFill>
-                <a:latin typeface="Consolas"/>
-              </a:defRPr>
-            </a:pPr>
-            <a:r>
-              <a:t>// C: Create</a:t>
-            </a:r>
-            <a:br/>
-            <a:r>
-              <a:t>db.clients.insertOne({nom: 'Jean'});</a:t>
-            </a:r>
-            <a:br/>
-            <a:br/>
-            <a:r>
-              <a:t>// R: Read</a:t>
-            </a:r>
-            <a:br/>
-            <a:r>
-              <a:t>db.clients.find({nom: 'Jean'});</a:t>
-            </a:r>
-            <a:br/>
-            <a:br/>
-            <a:r>
-              <a:t>// U: Update</a:t>
-            </a:r>
-            <a:br/>
-            <a:r>
-              <a:t>db.clients.updateOne({nom: 'Jean'}, {$set: {nom: 'Paul'}});</a:t>
-            </a:r>
-            <a:br/>
-            <a:br/>
-            <a:r>
-              <a:t>// D: Delete</a:t>
-            </a:r>
-            <a:br/>
-            <a:r>
-              <a:t>db.clients.deleteOne({nom: 'Paul'});</a:t>
-            </a:r>
-          </a:p>
-        </p:txBody>
-      </p:sp>
-    </p:spTree>
-  </p:cSld>
-  <p:clrMapOvr>
-    <a:masterClrMapping/>
-  </p:clrMapOvr>
-</p:sld>
-</file>
-
-<file path=ppt/slides/slide8.xml><?xml version="1.0" encoding="utf-8"?>
-<p:sld xmlns:a="http://schemas.openxmlformats.org/drawingml/2006/main" xmlns:p="http://schemas.openxmlformats.org/presentationml/2006/main" xmlns:r="http://schemas.openxmlformats.org/officeDocument/2006/relationships">
-  <p:cSld>
-    <p:spTree>
-      <p:nvGrpSpPr>
-        <p:cNvPr id="1" name=""/>
-        <p:cNvGrpSpPr/>
-        <p:nvPr/>
-      </p:nvGrpSpPr>
-      <p:grpSpPr/>
-      <p:sp>
-        <p:nvSpPr>
-          <p:cNvPr id="2" name="Title 1"/>
-          <p:cNvSpPr>
-            <a:spLocks noGrp="1"/>
-          </p:cNvSpPr>
-          <p:nvPr>
-            <p:ph type="title"/>
-          </p:nvPr>
-        </p:nvSpPr>
-        <p:spPr/>
-        <p:txBody>
-          <a:bodyPr/>
-          <a:lstStyle/>
-          <a:p>
-            <a:pPr algn="l">
-              <a:defRPr sz="3200">
-                <a:solidFill>
-                  <a:srgbClr val="003399"/>
-                </a:solidFill>
-                <a:latin typeface="Arial"/>
-              </a:defRPr>
-            </a:pPr>
-            <a:r>
-              <a:t>Ne pas confondre !</a:t>
-            </a:r>
-          </a:p>
-        </p:txBody>
-      </p:sp>
-      <p:sp>
-        <p:nvSpPr>
-          <p:cNvPr id="3" name="Rectangle 2"/>
-          <p:cNvSpPr/>
-          <p:nvPr/>
-        </p:nvSpPr>
-        <p:spPr>
-          <a:xfrm>
-            <a:off x="914400" y="1828800"/>
-            <a:ext cx="3200400" cy="1828800"/>
-          </a:xfrm>
-          <a:prstGeom prst="rect">
-            <a:avLst/>
-          </a:prstGeom>
-          <a:solidFill>
-            <a:srgbClr val="FF8C00"/>
-          </a:solidFill>
-          <a:ln>
-            <a:solidFill>
-              <a:srgbClr val="505050"/>
-            </a:solidFill>
-          </a:ln>
-        </p:spPr>
-        <p:style>
-          <a:lnRef idx="1">
-            <a:schemeClr val="accent1"/>
-          </a:lnRef>
-          <a:fillRef idx="3">
-            <a:schemeClr val="accent1"/>
-          </a:fillRef>
-          <a:effectRef idx="2">
-            <a:schemeClr val="accent1"/>
-          </a:effectRef>
-          <a:fontRef idx="minor">
-            <a:schemeClr val="lt1"/>
-          </a:fontRef>
-        </p:style>
-        <p:txBody>
-          <a:bodyPr rtlCol="0" anchor="ctr"/>
-          <a:lstStyle/>
-          <a:p>
-            <a:pPr algn="ctr">
-              <a:defRPr>
-                <a:solidFill>
-                  <a:srgbClr val="FFFFFF"/>
-                </a:solidFill>
-              </a:defRPr>
-            </a:pPr>
-            <a:r>
-              <a:t>DELETE</a:t>
-            </a:r>
-          </a:p>
-          <a:p>
-            <a:r>
-              <a:t>Supprime les DONNÉES.</a:t>
-            </a:r>
-          </a:p>
-          <a:p>
-            <a:r>
-              <a:t>La table (structure) reste vide.</a:t>
-            </a:r>
-          </a:p>
-          <a:p>
-            <a:r>
-              <a:t>On peut annuler (Rollback).</a:t>
-            </a:r>
-          </a:p>
-        </p:txBody>
-      </p:sp>
-      <p:sp>
-        <p:nvSpPr>
-          <p:cNvPr id="4" name="Rectangle 3"/>
-          <p:cNvSpPr/>
-          <p:nvPr/>
-        </p:nvSpPr>
-        <p:spPr>
-          <a:xfrm>
-            <a:off x="5029200" y="1828800"/>
-            <a:ext cx="3200400" cy="1828800"/>
-          </a:xfrm>
-          <a:prstGeom prst="rect">
-            <a:avLst/>
-          </a:prstGeom>
-          <a:solidFill>
-            <a:srgbClr val="003399"/>
-          </a:solidFill>
-          <a:ln>
-            <a:solidFill>
-              <a:srgbClr val="505050"/>
-            </a:solidFill>
-          </a:ln>
-        </p:spPr>
-        <p:style>
-          <a:lnRef idx="1">
-            <a:schemeClr val="accent1"/>
-          </a:lnRef>
-          <a:fillRef idx="3">
-            <a:schemeClr val="accent1"/>
-          </a:fillRef>
-          <a:effectRef idx="2">
-            <a:schemeClr val="accent1"/>
-          </a:effectRef>
-          <a:fontRef idx="minor">
-            <a:schemeClr val="lt1"/>
-          </a:fontRef>
-        </p:style>
-        <p:txBody>
-          <a:bodyPr rtlCol="0" anchor="ctr"/>
-          <a:lstStyle/>
-          <a:p>
-            <a:pPr algn="ctr">
-              <a:defRPr>
-                <a:solidFill>
-                  <a:srgbClr val="FFFFFF"/>
-                </a:solidFill>
-              </a:defRPr>
-            </a:pPr>
-            <a:r>
-              <a:t>DROP</a:t>
-            </a:r>
-          </a:p>
-          <a:p>
-            <a:r>
-              <a:t>Supprime TOUT.</a:t>
-            </a:r>
-          </a:p>
-          <a:p>
-            <a:r>
-              <a:t>Données + Structure.</a:t>
-            </a:r>
-          </a:p>
-          <a:p>
-            <a:r>
-              <a:t>Irréversible (sauf backup).</a:t>
-            </a:r>
-          </a:p>
-        </p:txBody>
-      </p:sp>
-    </p:spTree>
-  </p:cSld>
-  <p:clrMapOvr>
-    <a:masterClrMapping/>
-  </p:clrMapOvr>
-</p:sld>
-</file>
-
-<file path=ppt/slides/slide9.xml><?xml version="1.0" encoding="utf-8"?>
-<p:sld xmlns:a="http://schemas.openxmlformats.org/drawingml/2006/main" xmlns:p="http://schemas.openxmlformats.org/presentationml/2006/main" xmlns:r="http://schemas.openxmlformats.org/officeDocument/2006/relationships">
-  <p:cSld>
-    <p:spTree>
-      <p:nvGrpSpPr>
-        <p:cNvPr id="1" name=""/>
-        <p:cNvGrpSpPr/>
-        <p:nvPr/>
-      </p:nvGrpSpPr>
-      <p:grpSpPr/>
-      <p:sp>
-        <p:nvSpPr>
-          <p:cNvPr id="2" name="Title 1"/>
-          <p:cNvSpPr>
-            <a:spLocks noGrp="1"/>
-          </p:cNvSpPr>
-          <p:nvPr>
-            <p:ph type="title"/>
-          </p:nvPr>
-        </p:nvSpPr>
-        <p:spPr/>
-        <p:txBody>
-          <a:bodyPr/>
-          <a:lstStyle/>
-          <a:p>
-            <a:pPr algn="l">
-              <a:defRPr sz="3200">
-                <a:solidFill>
-                  <a:srgbClr val="003399"/>
-                </a:solidFill>
-                <a:latin typeface="Arial"/>
-              </a:defRPr>
-            </a:pPr>
-            <a:r>
-              <a:t>Standards Internationaux</a:t>
-            </a:r>
-          </a:p>
-        </p:txBody>
-      </p:sp>
-      <p:sp>
-        <p:nvSpPr>
-          <p:cNvPr id="3" name="TextBox 2"/>
-          <p:cNvSpPr txBox="1"/>
-          <p:nvPr/>
-        </p:nvSpPr>
-        <p:spPr>
-          <a:xfrm>
-            <a:off x="457200" y="1371600"/>
-            <a:ext cx="8229600" cy="4572000"/>
-          </a:xfrm>
-          <a:prstGeom prst="rect">
-            <a:avLst/>
-          </a:prstGeom>
-          <a:noFill/>
-        </p:spPr>
-        <p:txBody>
-          <a:bodyPr wrap="square">
-            <a:spAutoFit/>
-          </a:bodyPr>
-          <a:lstStyle/>
-          <a:p/>
-          <a:p>
-            <a:pPr>
-              <a:spcAft>
-                <a:spcPts val="1000"/>
-              </a:spcAft>
-              <a:defRPr sz="2000">
-                <a:solidFill>
-                  <a:srgbClr val="505050"/>
-                </a:solidFill>
-                <a:latin typeface="Calibri"/>
-              </a:defRPr>
-            </a:pPr>
-            <a:r>
-              <a:t>Dates (ISO 8601) : YYYY-MM-DD (2023-12-31).</a:t>
-            </a:r>
-          </a:p>
-          <a:p>
-            <a:pPr>
-              <a:spcAft>
-                <a:spcPts val="1000"/>
-              </a:spcAft>
-              <a:defRPr sz="2000">
-                <a:solidFill>
-                  <a:srgbClr val="505050"/>
-                </a:solidFill>
-                <a:latin typeface="Calibri"/>
-              </a:defRPr>
-            </a:pPr>
-            <a:r>
-              <a:t>Décimales : Point (.) ou Virgule (,) ? Dépend du système (US vs FR).</a:t>
-            </a:r>
-          </a:p>
-          <a:p>
-            <a:pPr>
-              <a:spcAft>
-                <a:spcPts val="1000"/>
-              </a:spcAft>
-              <a:defRPr sz="2000">
-                <a:solidFill>
-                  <a:srgbClr val="505050"/>
-                </a:solidFill>
-                <a:latin typeface="Calibri"/>
-              </a:defRPr>
-            </a:pPr>
-            <a:r>
-              <a:t>Encodage : UTF-8 (pour les accents é, à, ç).</a:t>
-            </a:r>
-          </a:p>
-        </p:txBody>
-      </p:sp>
-      <p:sp>
-        <p:nvSpPr>
-          <p:cNvPr id="4" name="Plaque 3"/>
-          <p:cNvSpPr/>
-          <p:nvPr/>
-        </p:nvSpPr>
-        <p:spPr>
-          <a:xfrm>
-            <a:off x="5486400" y="3657600"/>
-            <a:ext cx="2743200" cy="1371600"/>
-          </a:xfrm>
-          <a:prstGeom prst="plaque">
-            <a:avLst/>
-          </a:prstGeom>
-          <a:solidFill>
-            <a:srgbClr val="003399"/>
-          </a:solidFill>
-          <a:ln>
-            <a:solidFill>
-              <a:srgbClr val="505050"/>
-            </a:solidFill>
-          </a:ln>
-        </p:spPr>
-        <p:style>
-          <a:lnRef idx="1">
-            <a:schemeClr val="accent1"/>
-          </a:lnRef>
-          <a:fillRef idx="3">
-            <a:schemeClr val="accent1"/>
-          </a:fillRef>
-          <a:effectRef idx="2">
-            <a:schemeClr val="accent1"/>
-          </a:effectRef>
-          <a:fontRef idx="minor">
-            <a:schemeClr val="lt1"/>
-          </a:fontRef>
-        </p:style>
-        <p:txBody>
-          <a:bodyPr rtlCol="0" anchor="ctr"/>
-          <a:lstStyle/>
-          <a:p>
-            <a:pPr algn="ctr">
-              <a:defRPr>
-                <a:solidFill>
-                  <a:srgbClr val="FFFFFF"/>
-                </a:solidFill>
-              </a:defRPr>
-            </a:pPr>
-            <a:r>
-              <a:t>2023-12-31</a:t>
-            </a:r>
-          </a:p>
-          <a:p>
-            <a:r>
-              <a:t>✅ Standard</a:t>
             </a:r>
           </a:p>
         </p:txBody>

</xml_diff>